<commit_message>
image resized for powerpoint
</commit_message>
<xml_diff>
--- a/Team Cinco.pptx
+++ b/Team Cinco.pptx
@@ -123,6 +123,11 @@
       </a:defRPr>
     </a:lvl9pPr>
   </p:defaultTextStyle>
+  <p:extLst>
+    <p:ext uri="{EFAFB233-063F-42B5-8137-9DF3F51BA10A}">
+      <p15:sldGuideLst xmlns:p15="http://schemas.microsoft.com/office/powerpoint/2012/main"/>
+    </p:ext>
+  </p:extLst>
 </p:presentation>
 </file>
 
@@ -312,7 +317,7 @@
           <a:p>
             <a:fld id="{77A51DAD-568B-4CBD-A82C-A1BC36AF63F2}" type="datetimeFigureOut">
               <a:rPr lang="en-US" smtClean="0"/>
-              <a:t>1/14/2019</a:t>
+              <a:t>1/25/2019</a:t>
             </a:fld>
             <a:endParaRPr lang="en-US"/>
           </a:p>
@@ -587,7 +592,7 @@
           <a:p>
             <a:fld id="{77A51DAD-568B-4CBD-A82C-A1BC36AF63F2}" type="datetimeFigureOut">
               <a:rPr lang="en-US" smtClean="0"/>
-              <a:t>1/14/2019</a:t>
+              <a:t>1/25/2019</a:t>
             </a:fld>
             <a:endParaRPr lang="en-US"/>
           </a:p>
@@ -781,7 +786,7 @@
           <a:p>
             <a:fld id="{77A51DAD-568B-4CBD-A82C-A1BC36AF63F2}" type="datetimeFigureOut">
               <a:rPr lang="en-US" smtClean="0"/>
-              <a:t>1/14/2019</a:t>
+              <a:t>1/25/2019</a:t>
             </a:fld>
             <a:endParaRPr lang="en-US"/>
           </a:p>
@@ -1054,7 +1059,7 @@
           <a:p>
             <a:fld id="{77A51DAD-568B-4CBD-A82C-A1BC36AF63F2}" type="datetimeFigureOut">
               <a:rPr lang="en-US" smtClean="0"/>
-              <a:t>1/14/2019</a:t>
+              <a:t>1/25/2019</a:t>
             </a:fld>
             <a:endParaRPr lang="en-US"/>
           </a:p>
@@ -1395,7 +1400,7 @@
           <a:p>
             <a:fld id="{77A51DAD-568B-4CBD-A82C-A1BC36AF63F2}" type="datetimeFigureOut">
               <a:rPr lang="en-US" smtClean="0"/>
-              <a:t>1/14/2019</a:t>
+              <a:t>1/25/2019</a:t>
             </a:fld>
             <a:endParaRPr lang="en-US"/>
           </a:p>
@@ -2018,7 +2023,7 @@
           <a:p>
             <a:fld id="{77A51DAD-568B-4CBD-A82C-A1BC36AF63F2}" type="datetimeFigureOut">
               <a:rPr lang="en-US" smtClean="0"/>
-              <a:t>1/14/2019</a:t>
+              <a:t>1/25/2019</a:t>
             </a:fld>
             <a:endParaRPr lang="en-US"/>
           </a:p>
@@ -2878,7 +2883,7 @@
           <a:p>
             <a:fld id="{77A51DAD-568B-4CBD-A82C-A1BC36AF63F2}" type="datetimeFigureOut">
               <a:rPr lang="en-US" smtClean="0"/>
-              <a:t>1/14/2019</a:t>
+              <a:t>1/25/2019</a:t>
             </a:fld>
             <a:endParaRPr lang="en-US"/>
           </a:p>
@@ -3048,7 +3053,7 @@
           <a:p>
             <a:fld id="{77A51DAD-568B-4CBD-A82C-A1BC36AF63F2}" type="datetimeFigureOut">
               <a:rPr lang="en-US" smtClean="0"/>
-              <a:t>1/14/2019</a:t>
+              <a:t>1/25/2019</a:t>
             </a:fld>
             <a:endParaRPr lang="en-US"/>
           </a:p>
@@ -3228,7 +3233,7 @@
           <a:p>
             <a:fld id="{77A51DAD-568B-4CBD-A82C-A1BC36AF63F2}" type="datetimeFigureOut">
               <a:rPr lang="en-US" smtClean="0"/>
-              <a:t>1/14/2019</a:t>
+              <a:t>1/25/2019</a:t>
             </a:fld>
             <a:endParaRPr lang="en-US"/>
           </a:p>
@@ -3398,7 +3403,7 @@
           <a:p>
             <a:fld id="{77A51DAD-568B-4CBD-A82C-A1BC36AF63F2}" type="datetimeFigureOut">
               <a:rPr lang="en-US" smtClean="0"/>
-              <a:t>1/14/2019</a:t>
+              <a:t>1/25/2019</a:t>
             </a:fld>
             <a:endParaRPr lang="en-US"/>
           </a:p>
@@ -3645,7 +3650,7 @@
           <a:p>
             <a:fld id="{77A51DAD-568B-4CBD-A82C-A1BC36AF63F2}" type="datetimeFigureOut">
               <a:rPr lang="en-US" smtClean="0"/>
-              <a:t>1/14/2019</a:t>
+              <a:t>1/25/2019</a:t>
             </a:fld>
             <a:endParaRPr lang="en-US"/>
           </a:p>
@@ -3937,7 +3942,7 @@
           <a:p>
             <a:fld id="{77A51DAD-568B-4CBD-A82C-A1BC36AF63F2}" type="datetimeFigureOut">
               <a:rPr lang="en-US" smtClean="0"/>
-              <a:t>1/14/2019</a:t>
+              <a:t>1/25/2019</a:t>
             </a:fld>
             <a:endParaRPr lang="en-US"/>
           </a:p>
@@ -4381,7 +4386,7 @@
           <a:p>
             <a:fld id="{77A51DAD-568B-4CBD-A82C-A1BC36AF63F2}" type="datetimeFigureOut">
               <a:rPr lang="en-US" smtClean="0"/>
-              <a:t>1/14/2019</a:t>
+              <a:t>1/25/2019</a:t>
             </a:fld>
             <a:endParaRPr lang="en-US"/>
           </a:p>
@@ -4499,7 +4504,7 @@
           <a:p>
             <a:fld id="{77A51DAD-568B-4CBD-A82C-A1BC36AF63F2}" type="datetimeFigureOut">
               <a:rPr lang="en-US" smtClean="0"/>
-              <a:t>1/14/2019</a:t>
+              <a:t>1/25/2019</a:t>
             </a:fld>
             <a:endParaRPr lang="en-US"/>
           </a:p>
@@ -4594,7 +4599,7 @@
           <a:p>
             <a:fld id="{77A51DAD-568B-4CBD-A82C-A1BC36AF63F2}" type="datetimeFigureOut">
               <a:rPr lang="en-US" smtClean="0"/>
-              <a:t>1/14/2019</a:t>
+              <a:t>1/25/2019</a:t>
             </a:fld>
             <a:endParaRPr lang="en-US"/>
           </a:p>
@@ -4873,7 +4878,7 @@
           <a:p>
             <a:fld id="{77A51DAD-568B-4CBD-A82C-A1BC36AF63F2}" type="datetimeFigureOut">
               <a:rPr lang="en-US" smtClean="0"/>
-              <a:t>1/14/2019</a:t>
+              <a:t>1/25/2019</a:t>
             </a:fld>
             <a:endParaRPr lang="en-US"/>
           </a:p>
@@ -5148,7 +5153,7 @@
           <a:p>
             <a:fld id="{77A51DAD-568B-4CBD-A82C-A1BC36AF63F2}" type="datetimeFigureOut">
               <a:rPr lang="en-US" smtClean="0"/>
-              <a:t>1/14/2019</a:t>
+              <a:t>1/25/2019</a:t>
             </a:fld>
             <a:endParaRPr lang="en-US"/>
           </a:p>
@@ -5577,7 +5582,7 @@
           <a:p>
             <a:fld id="{77A51DAD-568B-4CBD-A82C-A1BC36AF63F2}" type="datetimeFigureOut">
               <a:rPr lang="en-US" smtClean="0"/>
-              <a:t>1/14/2019</a:t>
+              <a:t>1/25/2019</a:t>
             </a:fld>
             <a:endParaRPr lang="en-US"/>
           </a:p>
@@ -6240,13 +6245,7 @@
       </p:sp>
       <p:pic>
         <p:nvPicPr>
-          <p:cNvPr id="5" name="Content Placeholder 4">
-            <a:extLst>
-              <a:ext uri="{FF2B5EF4-FFF2-40B4-BE49-F238E27FC236}">
-                <a16:creationId xmlns:a16="http://schemas.microsoft.com/office/drawing/2014/main" id="{A917DDF0-564A-4AAB-950A-164084EB70F6}"/>
-              </a:ext>
-            </a:extLst>
-          </p:cNvPr>
+          <p:cNvPr id="7" name="內容版面配置區 6"/>
           <p:cNvPicPr>
             <a:picLocks noGrp="1" noChangeAspect="1"/>
           </p:cNvPicPr>
@@ -6255,7 +6254,7 @@
           </p:nvPr>
         </p:nvPicPr>
         <p:blipFill>
-          <a:blip r:embed="rId2">
+          <a:blip r:embed="rId2" cstate="print">
             <a:extLst>
               <a:ext uri="{28A0092B-C50C-407E-A947-70E740481C1C}">
                 <a14:useLocalDpi xmlns:a14="http://schemas.microsoft.com/office/drawing/2010/main" val="0"/>
@@ -6268,8 +6267,8 @@
         </p:blipFill>
         <p:spPr>
           <a:xfrm>
-            <a:off x="1550024" y="1216842"/>
-            <a:ext cx="7913291" cy="5188440"/>
+            <a:off x="1348485" y="1152983"/>
+            <a:ext cx="9082346" cy="5625886"/>
           </a:xfrm>
         </p:spPr>
       </p:pic>
@@ -6353,8 +6352,8 @@
         </p:blipFill>
         <p:spPr>
           <a:xfrm>
-            <a:off x="1393370" y="1325284"/>
-            <a:ext cx="8144989" cy="5079998"/>
+            <a:off x="1419748" y="1152983"/>
+            <a:ext cx="9000364" cy="5613492"/>
           </a:xfrm>
           <a:prstGeom prst="rect">
             <a:avLst/>
@@ -6421,32 +6420,31 @@
       </p:sp>
       <p:pic>
         <p:nvPicPr>
-          <p:cNvPr id="4" name="Picture 3">
+          <p:cNvPr id="5" name="內容版面配置區 4"/>
+          <p:cNvPicPr>
+            <a:picLocks noGrp="1" noChangeAspect="1"/>
+          </p:cNvPicPr>
+          <p:nvPr>
+            <p:ph idx="1"/>
+          </p:nvPr>
+        </p:nvPicPr>
+        <p:blipFill>
+          <a:blip r:embed="rId2" cstate="print">
             <a:extLst>
-              <a:ext uri="{FF2B5EF4-FFF2-40B4-BE49-F238E27FC236}">
-                <a16:creationId xmlns:a16="http://schemas.microsoft.com/office/drawing/2014/main" id="{8E47B903-FCB2-43BD-A940-4DA1FA6EEFF0}"/>
+              <a:ext uri="{28A0092B-C50C-407E-A947-70E740481C1C}">
+                <a14:useLocalDpi xmlns:a14="http://schemas.microsoft.com/office/drawing/2010/main" val="0"/>
               </a:ext>
             </a:extLst>
-          </p:cNvPr>
-          <p:cNvPicPr>
-            <a:picLocks noChangeAspect="1"/>
-          </p:cNvPicPr>
-          <p:nvPr/>
-        </p:nvPicPr>
-        <p:blipFill>
-          <a:blip r:embed="rId2"/>
+          </a:blip>
           <a:stretch>
             <a:fillRect/>
           </a:stretch>
         </p:blipFill>
         <p:spPr>
           <a:xfrm>
-            <a:off x="792846" y="1281404"/>
-            <a:ext cx="9599383" cy="5123878"/>
+            <a:off x="1872093" y="1152983"/>
+            <a:ext cx="8178741" cy="5631424"/>
           </a:xfrm>
-          <a:prstGeom prst="rect">
-            <a:avLst/>
-          </a:prstGeom>
         </p:spPr>
       </p:pic>
     </p:spTree>
@@ -7348,13 +7346,13 @@
           </p:nvPr>
         </p:nvPicPr>
         <p:blipFill>
-          <a:blip r:embed="rId2">
+          <a:blip r:embed="rId2" cstate="hqprint">
             <a:extLst>
               <a:ext uri="{28A0092B-C50C-407E-A947-70E740481C1C}">
                 <a14:useLocalDpi xmlns:a14="http://schemas.microsoft.com/office/drawing/2010/main" val="0"/>
               </a:ext>
               <a:ext uri="{837473B0-CC2E-450A-ABE3-18F120FF3D39}">
-                <a1611:picAttrSrcUrl xmlns:a1611="http://schemas.microsoft.com/office/drawing/2016/11/main" r:id="rId3"/>
+                <a1611:picAttrSrcUrl xmlns:a1611="http://schemas.microsoft.com/office/drawing/2016/11/main" xmlns="" r:id="rId3"/>
               </a:ext>
             </a:extLst>
           </a:blip>
@@ -8045,7 +8043,7 @@
           <p:nvPr/>
         </p:nvPicPr>
         <p:blipFill>
-          <a:blip r:embed="rId6">
+          <a:blip r:embed="rId6" cstate="hqprint">
             <a:extLst>
               <a:ext uri="{28A0092B-C50C-407E-A947-70E740481C1C}">
                 <a14:useLocalDpi xmlns:a14="http://schemas.microsoft.com/office/drawing/2010/main" val="0"/>
@@ -8696,13 +8694,7 @@
       </p:sp>
       <p:pic>
         <p:nvPicPr>
-          <p:cNvPr id="5" name="Content Placeholder 4">
-            <a:extLst>
-              <a:ext uri="{FF2B5EF4-FFF2-40B4-BE49-F238E27FC236}">
-                <a16:creationId xmlns:a16="http://schemas.microsoft.com/office/drawing/2014/main" id="{D20429ED-CA5D-41B0-9008-EBEC6FA93C0E}"/>
-              </a:ext>
-            </a:extLst>
-          </p:cNvPr>
+          <p:cNvPr id="4" name="內容版面配置區 3"/>
           <p:cNvPicPr>
             <a:picLocks noGrp="1" noChangeAspect="1"/>
           </p:cNvPicPr>
@@ -8711,7 +8703,7 @@
           </p:nvPr>
         </p:nvPicPr>
         <p:blipFill>
-          <a:blip r:embed="rId2">
+          <a:blip r:embed="rId2" cstate="print">
             <a:extLst>
               <a:ext uri="{28A0092B-C50C-407E-A947-70E740481C1C}">
                 <a14:useLocalDpi xmlns:a14="http://schemas.microsoft.com/office/drawing/2010/main" val="0"/>
@@ -8724,8 +8716,8 @@
         </p:blipFill>
         <p:spPr>
           <a:xfrm>
-            <a:off x="1465943" y="1309247"/>
-            <a:ext cx="8057380" cy="5214022"/>
+            <a:off x="1982542" y="1152983"/>
+            <a:ext cx="8453927" cy="5635951"/>
           </a:xfrm>
         </p:spPr>
       </p:pic>
@@ -8789,13 +8781,7 @@
       </p:sp>
       <p:pic>
         <p:nvPicPr>
-          <p:cNvPr id="5" name="Content Placeholder 4">
-            <a:extLst>
-              <a:ext uri="{FF2B5EF4-FFF2-40B4-BE49-F238E27FC236}">
-                <a16:creationId xmlns:a16="http://schemas.microsoft.com/office/drawing/2014/main" id="{8F9B8B0A-CECB-4591-A63B-FB20193BBC82}"/>
-              </a:ext>
-            </a:extLst>
-          </p:cNvPr>
+          <p:cNvPr id="9" name="內容版面配置區 8"/>
           <p:cNvPicPr>
             <a:picLocks noGrp="1" noChangeAspect="1"/>
           </p:cNvPicPr>
@@ -8804,7 +8790,7 @@
           </p:nvPr>
         </p:nvPicPr>
         <p:blipFill>
-          <a:blip r:embed="rId2">
+          <a:blip r:embed="rId2" cstate="print">
             <a:extLst>
               <a:ext uri="{28A0092B-C50C-407E-A947-70E740481C1C}">
                 <a14:useLocalDpi xmlns:a14="http://schemas.microsoft.com/office/drawing/2010/main" val="0"/>
@@ -8817,8 +8803,8 @@
         </p:blipFill>
         <p:spPr>
           <a:xfrm>
-            <a:off x="1480458" y="1273963"/>
-            <a:ext cx="7895728" cy="5263819"/>
+            <a:off x="1330899" y="1152983"/>
+            <a:ext cx="9087985" cy="5629379"/>
           </a:xfrm>
         </p:spPr>
       </p:pic>
@@ -8882,13 +8868,7 @@
       </p:sp>
       <p:pic>
         <p:nvPicPr>
-          <p:cNvPr id="5" name="Content Placeholder 4">
-            <a:extLst>
-              <a:ext uri="{FF2B5EF4-FFF2-40B4-BE49-F238E27FC236}">
-                <a16:creationId xmlns:a16="http://schemas.microsoft.com/office/drawing/2014/main" id="{C2652A1C-5098-4B6B-B1C0-07EFBB7C7987}"/>
-              </a:ext>
-            </a:extLst>
-          </p:cNvPr>
+          <p:cNvPr id="7" name="內容版面配置區 6"/>
           <p:cNvPicPr>
             <a:picLocks noGrp="1" noChangeAspect="1"/>
           </p:cNvPicPr>
@@ -8897,7 +8877,7 @@
           </p:nvPr>
         </p:nvPicPr>
         <p:blipFill>
-          <a:blip r:embed="rId2">
+          <a:blip r:embed="rId2" cstate="print">
             <a:extLst>
               <a:ext uri="{28A0092B-C50C-407E-A947-70E740481C1C}">
                 <a14:useLocalDpi xmlns:a14="http://schemas.microsoft.com/office/drawing/2010/main" val="0"/>
@@ -8910,8 +8890,8 @@
         </p:blipFill>
         <p:spPr>
           <a:xfrm>
-            <a:off x="1547855" y="1337793"/>
-            <a:ext cx="7601234" cy="5067489"/>
+            <a:off x="1348486" y="1152983"/>
+            <a:ext cx="9082346" cy="5625886"/>
           </a:xfrm>
         </p:spPr>
       </p:pic>
@@ -8975,13 +8955,7 @@
       </p:sp>
       <p:pic>
         <p:nvPicPr>
-          <p:cNvPr id="5" name="Content Placeholder 4">
-            <a:extLst>
-              <a:ext uri="{FF2B5EF4-FFF2-40B4-BE49-F238E27FC236}">
-                <a16:creationId xmlns:a16="http://schemas.microsoft.com/office/drawing/2014/main" id="{5B103440-F113-4F9E-9B22-DE18198E8DD3}"/>
-              </a:ext>
-            </a:extLst>
-          </p:cNvPr>
+          <p:cNvPr id="7" name="內容版面配置區 6"/>
           <p:cNvPicPr>
             <a:picLocks noGrp="1" noChangeAspect="1"/>
           </p:cNvPicPr>
@@ -8990,7 +8964,7 @@
           </p:nvPr>
         </p:nvPicPr>
         <p:blipFill>
-          <a:blip r:embed="rId2">
+          <a:blip r:embed="rId2" cstate="print">
             <a:extLst>
               <a:ext uri="{28A0092B-C50C-407E-A947-70E740481C1C}">
                 <a14:useLocalDpi xmlns:a14="http://schemas.microsoft.com/office/drawing/2010/main" val="0"/>
@@ -9003,8 +8977,8 @@
         </p:blipFill>
         <p:spPr>
           <a:xfrm>
-            <a:off x="1523999" y="1257549"/>
-            <a:ext cx="7895771" cy="5147733"/>
+            <a:off x="1357278" y="1152983"/>
+            <a:ext cx="9068152" cy="5617094"/>
           </a:xfrm>
         </p:spPr>
       </p:pic>

</xml_diff>

<commit_message>
images corrected and resized
</commit_message>
<xml_diff>
--- a/Team Cinco.pptx
+++ b/Team Cinco.pptx
@@ -123,6 +123,11 @@
       </a:defRPr>
     </a:lvl9pPr>
   </p:defaultTextStyle>
+  <p:extLst>
+    <p:ext uri="{EFAFB233-063F-42B5-8137-9DF3F51BA10A}">
+      <p15:sldGuideLst xmlns:p15="http://schemas.microsoft.com/office/powerpoint/2012/main"/>
+    </p:ext>
+  </p:extLst>
 </p:presentation>
 </file>
 
@@ -312,7 +317,7 @@
           <a:p>
             <a:fld id="{77A51DAD-568B-4CBD-A82C-A1BC36AF63F2}" type="datetimeFigureOut">
               <a:rPr lang="en-US" smtClean="0"/>
-              <a:t>1/14/2019</a:t>
+              <a:t>1/25/2019</a:t>
             </a:fld>
             <a:endParaRPr lang="en-US"/>
           </a:p>
@@ -587,7 +592,7 @@
           <a:p>
             <a:fld id="{77A51DAD-568B-4CBD-A82C-A1BC36AF63F2}" type="datetimeFigureOut">
               <a:rPr lang="en-US" smtClean="0"/>
-              <a:t>1/14/2019</a:t>
+              <a:t>1/25/2019</a:t>
             </a:fld>
             <a:endParaRPr lang="en-US"/>
           </a:p>
@@ -781,7 +786,7 @@
           <a:p>
             <a:fld id="{77A51DAD-568B-4CBD-A82C-A1BC36AF63F2}" type="datetimeFigureOut">
               <a:rPr lang="en-US" smtClean="0"/>
-              <a:t>1/14/2019</a:t>
+              <a:t>1/25/2019</a:t>
             </a:fld>
             <a:endParaRPr lang="en-US"/>
           </a:p>
@@ -1054,7 +1059,7 @@
           <a:p>
             <a:fld id="{77A51DAD-568B-4CBD-A82C-A1BC36AF63F2}" type="datetimeFigureOut">
               <a:rPr lang="en-US" smtClean="0"/>
-              <a:t>1/14/2019</a:t>
+              <a:t>1/25/2019</a:t>
             </a:fld>
             <a:endParaRPr lang="en-US"/>
           </a:p>
@@ -1395,7 +1400,7 @@
           <a:p>
             <a:fld id="{77A51DAD-568B-4CBD-A82C-A1BC36AF63F2}" type="datetimeFigureOut">
               <a:rPr lang="en-US" smtClean="0"/>
-              <a:t>1/14/2019</a:t>
+              <a:t>1/25/2019</a:t>
             </a:fld>
             <a:endParaRPr lang="en-US"/>
           </a:p>
@@ -2018,7 +2023,7 @@
           <a:p>
             <a:fld id="{77A51DAD-568B-4CBD-A82C-A1BC36AF63F2}" type="datetimeFigureOut">
               <a:rPr lang="en-US" smtClean="0"/>
-              <a:t>1/14/2019</a:t>
+              <a:t>1/25/2019</a:t>
             </a:fld>
             <a:endParaRPr lang="en-US"/>
           </a:p>
@@ -2878,7 +2883,7 @@
           <a:p>
             <a:fld id="{77A51DAD-568B-4CBD-A82C-A1BC36AF63F2}" type="datetimeFigureOut">
               <a:rPr lang="en-US" smtClean="0"/>
-              <a:t>1/14/2019</a:t>
+              <a:t>1/25/2019</a:t>
             </a:fld>
             <a:endParaRPr lang="en-US"/>
           </a:p>
@@ -3048,7 +3053,7 @@
           <a:p>
             <a:fld id="{77A51DAD-568B-4CBD-A82C-A1BC36AF63F2}" type="datetimeFigureOut">
               <a:rPr lang="en-US" smtClean="0"/>
-              <a:t>1/14/2019</a:t>
+              <a:t>1/25/2019</a:t>
             </a:fld>
             <a:endParaRPr lang="en-US"/>
           </a:p>
@@ -3228,7 +3233,7 @@
           <a:p>
             <a:fld id="{77A51DAD-568B-4CBD-A82C-A1BC36AF63F2}" type="datetimeFigureOut">
               <a:rPr lang="en-US" smtClean="0"/>
-              <a:t>1/14/2019</a:t>
+              <a:t>1/25/2019</a:t>
             </a:fld>
             <a:endParaRPr lang="en-US"/>
           </a:p>
@@ -3398,7 +3403,7 @@
           <a:p>
             <a:fld id="{77A51DAD-568B-4CBD-A82C-A1BC36AF63F2}" type="datetimeFigureOut">
               <a:rPr lang="en-US" smtClean="0"/>
-              <a:t>1/14/2019</a:t>
+              <a:t>1/25/2019</a:t>
             </a:fld>
             <a:endParaRPr lang="en-US"/>
           </a:p>
@@ -3645,7 +3650,7 @@
           <a:p>
             <a:fld id="{77A51DAD-568B-4CBD-A82C-A1BC36AF63F2}" type="datetimeFigureOut">
               <a:rPr lang="en-US" smtClean="0"/>
-              <a:t>1/14/2019</a:t>
+              <a:t>1/25/2019</a:t>
             </a:fld>
             <a:endParaRPr lang="en-US"/>
           </a:p>
@@ -3937,7 +3942,7 @@
           <a:p>
             <a:fld id="{77A51DAD-568B-4CBD-A82C-A1BC36AF63F2}" type="datetimeFigureOut">
               <a:rPr lang="en-US" smtClean="0"/>
-              <a:t>1/14/2019</a:t>
+              <a:t>1/25/2019</a:t>
             </a:fld>
             <a:endParaRPr lang="en-US"/>
           </a:p>
@@ -4381,7 +4386,7 @@
           <a:p>
             <a:fld id="{77A51DAD-568B-4CBD-A82C-A1BC36AF63F2}" type="datetimeFigureOut">
               <a:rPr lang="en-US" smtClean="0"/>
-              <a:t>1/14/2019</a:t>
+              <a:t>1/25/2019</a:t>
             </a:fld>
             <a:endParaRPr lang="en-US"/>
           </a:p>
@@ -4499,7 +4504,7 @@
           <a:p>
             <a:fld id="{77A51DAD-568B-4CBD-A82C-A1BC36AF63F2}" type="datetimeFigureOut">
               <a:rPr lang="en-US" smtClean="0"/>
-              <a:t>1/14/2019</a:t>
+              <a:t>1/25/2019</a:t>
             </a:fld>
             <a:endParaRPr lang="en-US"/>
           </a:p>
@@ -4594,7 +4599,7 @@
           <a:p>
             <a:fld id="{77A51DAD-568B-4CBD-A82C-A1BC36AF63F2}" type="datetimeFigureOut">
               <a:rPr lang="en-US" smtClean="0"/>
-              <a:t>1/14/2019</a:t>
+              <a:t>1/25/2019</a:t>
             </a:fld>
             <a:endParaRPr lang="en-US"/>
           </a:p>
@@ -4873,7 +4878,7 @@
           <a:p>
             <a:fld id="{77A51DAD-568B-4CBD-A82C-A1BC36AF63F2}" type="datetimeFigureOut">
               <a:rPr lang="en-US" smtClean="0"/>
-              <a:t>1/14/2019</a:t>
+              <a:t>1/25/2019</a:t>
             </a:fld>
             <a:endParaRPr lang="en-US"/>
           </a:p>
@@ -5148,7 +5153,7 @@
           <a:p>
             <a:fld id="{77A51DAD-568B-4CBD-A82C-A1BC36AF63F2}" type="datetimeFigureOut">
               <a:rPr lang="en-US" smtClean="0"/>
-              <a:t>1/14/2019</a:t>
+              <a:t>1/25/2019</a:t>
             </a:fld>
             <a:endParaRPr lang="en-US"/>
           </a:p>
@@ -5577,7 +5582,7 @@
           <a:p>
             <a:fld id="{77A51DAD-568B-4CBD-A82C-A1BC36AF63F2}" type="datetimeFigureOut">
               <a:rPr lang="en-US" smtClean="0"/>
-              <a:t>1/14/2019</a:t>
+              <a:t>1/25/2019</a:t>
             </a:fld>
             <a:endParaRPr lang="en-US"/>
           </a:p>
@@ -6240,13 +6245,7 @@
       </p:sp>
       <p:pic>
         <p:nvPicPr>
-          <p:cNvPr id="5" name="Content Placeholder 4">
-            <a:extLst>
-              <a:ext uri="{FF2B5EF4-FFF2-40B4-BE49-F238E27FC236}">
-                <a16:creationId xmlns:a16="http://schemas.microsoft.com/office/drawing/2014/main" id="{A917DDF0-564A-4AAB-950A-164084EB70F6}"/>
-              </a:ext>
-            </a:extLst>
-          </p:cNvPr>
+          <p:cNvPr id="7" name="內容版面配置區 6"/>
           <p:cNvPicPr>
             <a:picLocks noGrp="1" noChangeAspect="1"/>
           </p:cNvPicPr>
@@ -6255,7 +6254,7 @@
           </p:nvPr>
         </p:nvPicPr>
         <p:blipFill>
-          <a:blip r:embed="rId2">
+          <a:blip r:embed="rId2" cstate="print">
             <a:extLst>
               <a:ext uri="{28A0092B-C50C-407E-A947-70E740481C1C}">
                 <a14:useLocalDpi xmlns:a14="http://schemas.microsoft.com/office/drawing/2010/main" val="0"/>
@@ -6268,8 +6267,8 @@
         </p:blipFill>
         <p:spPr>
           <a:xfrm>
-            <a:off x="1550024" y="1216842"/>
-            <a:ext cx="7913291" cy="5188440"/>
+            <a:off x="1348485" y="1152983"/>
+            <a:ext cx="9082346" cy="5625886"/>
           </a:xfrm>
         </p:spPr>
       </p:pic>
@@ -6353,8 +6352,8 @@
         </p:blipFill>
         <p:spPr>
           <a:xfrm>
-            <a:off x="1393370" y="1325284"/>
-            <a:ext cx="8144989" cy="5079998"/>
+            <a:off x="1419748" y="1152983"/>
+            <a:ext cx="9000364" cy="5613492"/>
           </a:xfrm>
           <a:prstGeom prst="rect">
             <a:avLst/>
@@ -6421,32 +6420,31 @@
       </p:sp>
       <p:pic>
         <p:nvPicPr>
-          <p:cNvPr id="4" name="Picture 3">
+          <p:cNvPr id="5" name="內容版面配置區 4"/>
+          <p:cNvPicPr>
+            <a:picLocks noGrp="1" noChangeAspect="1"/>
+          </p:cNvPicPr>
+          <p:nvPr>
+            <p:ph idx="1"/>
+          </p:nvPr>
+        </p:nvPicPr>
+        <p:blipFill>
+          <a:blip r:embed="rId2" cstate="print">
             <a:extLst>
-              <a:ext uri="{FF2B5EF4-FFF2-40B4-BE49-F238E27FC236}">
-                <a16:creationId xmlns:a16="http://schemas.microsoft.com/office/drawing/2014/main" id="{8E47B903-FCB2-43BD-A940-4DA1FA6EEFF0}"/>
+              <a:ext uri="{28A0092B-C50C-407E-A947-70E740481C1C}">
+                <a14:useLocalDpi xmlns:a14="http://schemas.microsoft.com/office/drawing/2010/main" val="0"/>
               </a:ext>
             </a:extLst>
-          </p:cNvPr>
-          <p:cNvPicPr>
-            <a:picLocks noChangeAspect="1"/>
-          </p:cNvPicPr>
-          <p:nvPr/>
-        </p:nvPicPr>
-        <p:blipFill>
-          <a:blip r:embed="rId2"/>
+          </a:blip>
           <a:stretch>
             <a:fillRect/>
           </a:stretch>
         </p:blipFill>
         <p:spPr>
           <a:xfrm>
-            <a:off x="792846" y="1281404"/>
-            <a:ext cx="9599383" cy="5123878"/>
+            <a:off x="1872093" y="1152983"/>
+            <a:ext cx="8178741" cy="5631424"/>
           </a:xfrm>
-          <a:prstGeom prst="rect">
-            <a:avLst/>
-          </a:prstGeom>
         </p:spPr>
       </p:pic>
     </p:spTree>
@@ -7348,13 +7346,13 @@
           </p:nvPr>
         </p:nvPicPr>
         <p:blipFill>
-          <a:blip r:embed="rId2">
+          <a:blip r:embed="rId2" cstate="hqprint">
             <a:extLst>
               <a:ext uri="{28A0092B-C50C-407E-A947-70E740481C1C}">
                 <a14:useLocalDpi xmlns:a14="http://schemas.microsoft.com/office/drawing/2010/main" val="0"/>
               </a:ext>
               <a:ext uri="{837473B0-CC2E-450A-ABE3-18F120FF3D39}">
-                <a1611:picAttrSrcUrl xmlns:a1611="http://schemas.microsoft.com/office/drawing/2016/11/main" r:id="rId3"/>
+                <a1611:picAttrSrcUrl xmlns:a1611="http://schemas.microsoft.com/office/drawing/2016/11/main" xmlns="" r:id="rId3"/>
               </a:ext>
             </a:extLst>
           </a:blip>
@@ -8045,7 +8043,7 @@
           <p:nvPr/>
         </p:nvPicPr>
         <p:blipFill>
-          <a:blip r:embed="rId6">
+          <a:blip r:embed="rId6" cstate="hqprint">
             <a:extLst>
               <a:ext uri="{28A0092B-C50C-407E-A947-70E740481C1C}">
                 <a14:useLocalDpi xmlns:a14="http://schemas.microsoft.com/office/drawing/2010/main" val="0"/>
@@ -8696,13 +8694,7 @@
       </p:sp>
       <p:pic>
         <p:nvPicPr>
-          <p:cNvPr id="5" name="Content Placeholder 4">
-            <a:extLst>
-              <a:ext uri="{FF2B5EF4-FFF2-40B4-BE49-F238E27FC236}">
-                <a16:creationId xmlns:a16="http://schemas.microsoft.com/office/drawing/2014/main" id="{D20429ED-CA5D-41B0-9008-EBEC6FA93C0E}"/>
-              </a:ext>
-            </a:extLst>
-          </p:cNvPr>
+          <p:cNvPr id="4" name="內容版面配置區 3"/>
           <p:cNvPicPr>
             <a:picLocks noGrp="1" noChangeAspect="1"/>
           </p:cNvPicPr>
@@ -8711,7 +8703,7 @@
           </p:nvPr>
         </p:nvPicPr>
         <p:blipFill>
-          <a:blip r:embed="rId2">
+          <a:blip r:embed="rId2" cstate="print">
             <a:extLst>
               <a:ext uri="{28A0092B-C50C-407E-A947-70E740481C1C}">
                 <a14:useLocalDpi xmlns:a14="http://schemas.microsoft.com/office/drawing/2010/main" val="0"/>
@@ -8724,8 +8716,8 @@
         </p:blipFill>
         <p:spPr>
           <a:xfrm>
-            <a:off x="1465943" y="1309247"/>
-            <a:ext cx="8057380" cy="5214022"/>
+            <a:off x="1982542" y="1152983"/>
+            <a:ext cx="8453927" cy="5635951"/>
           </a:xfrm>
         </p:spPr>
       </p:pic>
@@ -8789,13 +8781,7 @@
       </p:sp>
       <p:pic>
         <p:nvPicPr>
-          <p:cNvPr id="5" name="Content Placeholder 4">
-            <a:extLst>
-              <a:ext uri="{FF2B5EF4-FFF2-40B4-BE49-F238E27FC236}">
-                <a16:creationId xmlns:a16="http://schemas.microsoft.com/office/drawing/2014/main" id="{8F9B8B0A-CECB-4591-A63B-FB20193BBC82}"/>
-              </a:ext>
-            </a:extLst>
-          </p:cNvPr>
+          <p:cNvPr id="9" name="內容版面配置區 8"/>
           <p:cNvPicPr>
             <a:picLocks noGrp="1" noChangeAspect="1"/>
           </p:cNvPicPr>
@@ -8804,7 +8790,7 @@
           </p:nvPr>
         </p:nvPicPr>
         <p:blipFill>
-          <a:blip r:embed="rId2">
+          <a:blip r:embed="rId2" cstate="print">
             <a:extLst>
               <a:ext uri="{28A0092B-C50C-407E-A947-70E740481C1C}">
                 <a14:useLocalDpi xmlns:a14="http://schemas.microsoft.com/office/drawing/2010/main" val="0"/>
@@ -8817,8 +8803,8 @@
         </p:blipFill>
         <p:spPr>
           <a:xfrm>
-            <a:off x="1480458" y="1273963"/>
-            <a:ext cx="7895728" cy="5263819"/>
+            <a:off x="1330899" y="1152983"/>
+            <a:ext cx="9087985" cy="5629379"/>
           </a:xfrm>
         </p:spPr>
       </p:pic>
@@ -8882,13 +8868,7 @@
       </p:sp>
       <p:pic>
         <p:nvPicPr>
-          <p:cNvPr id="5" name="Content Placeholder 4">
-            <a:extLst>
-              <a:ext uri="{FF2B5EF4-FFF2-40B4-BE49-F238E27FC236}">
-                <a16:creationId xmlns:a16="http://schemas.microsoft.com/office/drawing/2014/main" id="{C2652A1C-5098-4B6B-B1C0-07EFBB7C7987}"/>
-              </a:ext>
-            </a:extLst>
-          </p:cNvPr>
+          <p:cNvPr id="7" name="內容版面配置區 6"/>
           <p:cNvPicPr>
             <a:picLocks noGrp="1" noChangeAspect="1"/>
           </p:cNvPicPr>
@@ -8897,7 +8877,7 @@
           </p:nvPr>
         </p:nvPicPr>
         <p:blipFill>
-          <a:blip r:embed="rId2">
+          <a:blip r:embed="rId2" cstate="print">
             <a:extLst>
               <a:ext uri="{28A0092B-C50C-407E-A947-70E740481C1C}">
                 <a14:useLocalDpi xmlns:a14="http://schemas.microsoft.com/office/drawing/2010/main" val="0"/>
@@ -8910,8 +8890,8 @@
         </p:blipFill>
         <p:spPr>
           <a:xfrm>
-            <a:off x="1547855" y="1337793"/>
-            <a:ext cx="7601234" cy="5067489"/>
+            <a:off x="1348486" y="1152983"/>
+            <a:ext cx="9082346" cy="5625886"/>
           </a:xfrm>
         </p:spPr>
       </p:pic>
@@ -8975,13 +8955,7 @@
       </p:sp>
       <p:pic>
         <p:nvPicPr>
-          <p:cNvPr id="5" name="Content Placeholder 4">
-            <a:extLst>
-              <a:ext uri="{FF2B5EF4-FFF2-40B4-BE49-F238E27FC236}">
-                <a16:creationId xmlns:a16="http://schemas.microsoft.com/office/drawing/2014/main" id="{5B103440-F113-4F9E-9B22-DE18198E8DD3}"/>
-              </a:ext>
-            </a:extLst>
-          </p:cNvPr>
+          <p:cNvPr id="7" name="內容版面配置區 6"/>
           <p:cNvPicPr>
             <a:picLocks noGrp="1" noChangeAspect="1"/>
           </p:cNvPicPr>
@@ -8990,7 +8964,7 @@
           </p:nvPr>
         </p:nvPicPr>
         <p:blipFill>
-          <a:blip r:embed="rId2">
+          <a:blip r:embed="rId2" cstate="print">
             <a:extLst>
               <a:ext uri="{28A0092B-C50C-407E-A947-70E740481C1C}">
                 <a14:useLocalDpi xmlns:a14="http://schemas.microsoft.com/office/drawing/2010/main" val="0"/>
@@ -9003,8 +8977,8 @@
         </p:blipFill>
         <p:spPr>
           <a:xfrm>
-            <a:off x="1523999" y="1257549"/>
-            <a:ext cx="7895771" cy="5147733"/>
+            <a:off x="1357278" y="1152983"/>
+            <a:ext cx="9068152" cy="5617094"/>
           </a:xfrm>
         </p:spPr>
       </p:pic>

</xml_diff>